<commit_message>
Update presentation logo (#344)
</commit_message>
<xml_diff>
--- a/Denys Shevchuk/Sledzenie.pptx
+++ b/Denys Shevchuk/Sledzenie.pptx
@@ -113,6 +113,11 @@
       </a:defRPr>
     </a:lvl9pPr>
   </p:defaultTextStyle>
+  <p:extLst>
+    <p:ext uri="{EFAFB233-063F-42B5-8137-9DF3F51BA10A}">
+      <p15:sldGuideLst xmlns:p15="http://schemas.microsoft.com/office/powerpoint/2012/main"/>
+    </p:ext>
+  </p:extLst>
 </p:presentation>
 </file>
 
@@ -299,7 +304,7 @@
           <a:p>
             <a:fld id="{4AAD347D-5ACD-4C99-B74B-A9C85AD731AF}" type="datetimeFigureOut">
               <a:rPr lang="en-US" dirty="0"/>
-              <a:t>12/8/2022</a:t>
+              <a:t>12/16/2022</a:t>
             </a:fld>
             <a:endParaRPr lang="en-US" dirty="0"/>
           </a:p>
@@ -569,7 +574,7 @@
           <a:p>
             <a:fld id="{4509A250-FF31-4206-8172-F9D3106AACB1}" type="datetimeFigureOut">
               <a:rPr lang="en-US" dirty="0"/>
-              <a:t>12/8/2022</a:t>
+              <a:t>12/16/2022</a:t>
             </a:fld>
             <a:endParaRPr lang="en-US" dirty="0"/>
           </a:p>
@@ -758,7 +763,7 @@
           <a:p>
             <a:fld id="{4509A250-FF31-4206-8172-F9D3106AACB1}" type="datetimeFigureOut">
               <a:rPr lang="en-US" dirty="0"/>
-              <a:t>12/8/2022</a:t>
+              <a:t>12/16/2022</a:t>
             </a:fld>
             <a:endParaRPr lang="en-US" dirty="0"/>
           </a:p>
@@ -1021,7 +1026,7 @@
           <a:p>
             <a:fld id="{4509A250-FF31-4206-8172-F9D3106AACB1}" type="datetimeFigureOut">
               <a:rPr lang="en-US" dirty="0"/>
-              <a:t>12/8/2022</a:t>
+              <a:t>12/16/2022</a:t>
             </a:fld>
             <a:endParaRPr lang="en-US" dirty="0"/>
           </a:p>
@@ -1348,7 +1353,7 @@
           <a:p>
             <a:fld id="{4509A250-FF31-4206-8172-F9D3106AACB1}" type="datetimeFigureOut">
               <a:rPr lang="en-US" dirty="0"/>
-              <a:t>12/8/2022</a:t>
+              <a:t>12/16/2022</a:t>
             </a:fld>
             <a:endParaRPr lang="en-US" dirty="0"/>
           </a:p>
@@ -1953,7 +1958,7 @@
           <a:p>
             <a:fld id="{4509A250-FF31-4206-8172-F9D3106AACB1}" type="datetimeFigureOut">
               <a:rPr lang="en-US" dirty="0"/>
-              <a:t>12/8/2022</a:t>
+              <a:t>12/16/2022</a:t>
             </a:fld>
             <a:endParaRPr lang="en-US" dirty="0"/>
           </a:p>
@@ -2795,7 +2800,7 @@
           <a:p>
             <a:fld id="{4509A250-FF31-4206-8172-F9D3106AACB1}" type="datetimeFigureOut">
               <a:rPr lang="en-US" dirty="0"/>
-              <a:t>12/8/2022</a:t>
+              <a:t>12/16/2022</a:t>
             </a:fld>
             <a:endParaRPr lang="en-US" dirty="0"/>
           </a:p>
@@ -2960,7 +2965,7 @@
           <a:p>
             <a:fld id="{4509A250-FF31-4206-8172-F9D3106AACB1}" type="datetimeFigureOut">
               <a:rPr lang="en-US" dirty="0"/>
-              <a:t>12/8/2022</a:t>
+              <a:t>12/16/2022</a:t>
             </a:fld>
             <a:endParaRPr lang="en-US" dirty="0"/>
           </a:p>
@@ -3135,7 +3140,7 @@
           <a:p>
             <a:fld id="{4509A250-FF31-4206-8172-F9D3106AACB1}" type="datetimeFigureOut">
               <a:rPr lang="en-US" dirty="0"/>
-              <a:t>12/8/2022</a:t>
+              <a:t>12/16/2022</a:t>
             </a:fld>
             <a:endParaRPr lang="en-US" dirty="0"/>
           </a:p>
@@ -3300,7 +3305,7 @@
           <a:p>
             <a:fld id="{4509A250-FF31-4206-8172-F9D3106AACB1}" type="datetimeFigureOut">
               <a:rPr lang="en-US" dirty="0"/>
-              <a:t>12/8/2022</a:t>
+              <a:t>12/16/2022</a:t>
             </a:fld>
             <a:endParaRPr lang="en-US" dirty="0"/>
           </a:p>
@@ -3539,7 +3544,7 @@
           <a:p>
             <a:fld id="{4509A250-FF31-4206-8172-F9D3106AACB1}" type="datetimeFigureOut">
               <a:rPr lang="en-US" dirty="0"/>
-              <a:t>12/8/2022</a:t>
+              <a:t>12/16/2022</a:t>
             </a:fld>
             <a:endParaRPr lang="en-US" dirty="0"/>
           </a:p>
@@ -3826,7 +3831,7 @@
           <a:p>
             <a:fld id="{4509A250-FF31-4206-8172-F9D3106AACB1}" type="datetimeFigureOut">
               <a:rPr lang="en-US" dirty="0"/>
-              <a:t>12/8/2022</a:t>
+              <a:t>12/16/2022</a:t>
             </a:fld>
             <a:endParaRPr lang="en-US" dirty="0"/>
           </a:p>
@@ -4259,7 +4264,7 @@
           <a:p>
             <a:fld id="{4509A250-FF31-4206-8172-F9D3106AACB1}" type="datetimeFigureOut">
               <a:rPr lang="en-US" dirty="0"/>
-              <a:t>12/8/2022</a:t>
+              <a:t>12/16/2022</a:t>
             </a:fld>
             <a:endParaRPr lang="en-US" dirty="0"/>
           </a:p>
@@ -4372,7 +4377,7 @@
           <a:p>
             <a:fld id="{4509A250-FF31-4206-8172-F9D3106AACB1}" type="datetimeFigureOut">
               <a:rPr lang="en-US" dirty="0"/>
-              <a:t>12/8/2022</a:t>
+              <a:t>12/16/2022</a:t>
             </a:fld>
             <a:endParaRPr lang="en-US" dirty="0"/>
           </a:p>
@@ -4462,7 +4467,7 @@
           <a:p>
             <a:fld id="{4509A250-FF31-4206-8172-F9D3106AACB1}" type="datetimeFigureOut">
               <a:rPr lang="en-US" dirty="0"/>
-              <a:t>12/8/2022</a:t>
+              <a:t>12/16/2022</a:t>
             </a:fld>
             <a:endParaRPr lang="en-US" dirty="0"/>
           </a:p>
@@ -4736,7 +4741,7 @@
           <a:p>
             <a:fld id="{4509A250-FF31-4206-8172-F9D3106AACB1}" type="datetimeFigureOut">
               <a:rPr lang="en-US" dirty="0"/>
-              <a:t>12/8/2022</a:t>
+              <a:t>12/16/2022</a:t>
             </a:fld>
             <a:endParaRPr lang="en-US" dirty="0"/>
           </a:p>
@@ -5006,7 +5011,7 @@
           <a:p>
             <a:fld id="{4509A250-FF31-4206-8172-F9D3106AACB1}" type="datetimeFigureOut">
               <a:rPr lang="en-US" dirty="0"/>
-              <a:t>12/8/2022</a:t>
+              <a:t>12/16/2022</a:t>
             </a:fld>
             <a:endParaRPr lang="en-US" dirty="0"/>
           </a:p>
@@ -5430,7 +5435,7 @@
           <a:p>
             <a:fld id="{4509A250-FF31-4206-8172-F9D3106AACB1}" type="datetimeFigureOut">
               <a:rPr lang="en-US" dirty="0"/>
-              <a:t>12/8/2022</a:t>
+              <a:t>12/16/2022</a:t>
             </a:fld>
             <a:endParaRPr lang="en-US" dirty="0"/>
           </a:p>
@@ -6013,6 +6018,43 @@
           </a:p>
         </p:txBody>
       </p:sp>
+      <p:pic>
+        <p:nvPicPr>
+          <p:cNvPr id="2" name="Рисунок 1"/>
+          <p:cNvPicPr>
+            <a:picLocks noChangeAspect="1"/>
+          </p:cNvPicPr>
+          <p:nvPr/>
+        </p:nvPicPr>
+        <p:blipFill>
+          <a:blip r:embed="rId2">
+            <a:duotone>
+              <a:prstClr val="black"/>
+              <a:srgbClr val="FF0000">
+                <a:tint val="45000"/>
+                <a:satMod val="400000"/>
+              </a:srgbClr>
+            </a:duotone>
+            <a:extLst>
+              <a:ext uri="{28A0092B-C50C-407E-A947-70E740481C1C}">
+                <a14:useLocalDpi xmlns:a14="http://schemas.microsoft.com/office/drawing/2010/main" val="0"/>
+              </a:ext>
+            </a:extLst>
+          </a:blip>
+          <a:stretch>
+            <a:fillRect/>
+          </a:stretch>
+        </p:blipFill>
+        <p:spPr>
+          <a:xfrm>
+            <a:off x="11026082" y="5694344"/>
+            <a:ext cx="886056" cy="1101986"/>
+          </a:xfrm>
+          <a:prstGeom prst="rect">
+            <a:avLst/>
+          </a:prstGeom>
+        </p:spPr>
+      </p:pic>
     </p:spTree>
     <p:extLst>
       <p:ext uri="{BB962C8B-B14F-4D97-AF65-F5344CB8AC3E}">
@@ -6337,6 +6379,43 @@
           </a:p>
         </p:txBody>
       </p:sp>
+      <p:pic>
+        <p:nvPicPr>
+          <p:cNvPr id="5" name="Рисунок 4"/>
+          <p:cNvPicPr>
+            <a:picLocks noChangeAspect="1"/>
+          </p:cNvPicPr>
+          <p:nvPr/>
+        </p:nvPicPr>
+        <p:blipFill>
+          <a:blip r:embed="rId2">
+            <a:duotone>
+              <a:prstClr val="black"/>
+              <a:srgbClr val="FF0000">
+                <a:tint val="45000"/>
+                <a:satMod val="400000"/>
+              </a:srgbClr>
+            </a:duotone>
+            <a:extLst>
+              <a:ext uri="{28A0092B-C50C-407E-A947-70E740481C1C}">
+                <a14:useLocalDpi xmlns:a14="http://schemas.microsoft.com/office/drawing/2010/main" val="0"/>
+              </a:ext>
+            </a:extLst>
+          </a:blip>
+          <a:stretch>
+            <a:fillRect/>
+          </a:stretch>
+        </p:blipFill>
+        <p:spPr>
+          <a:xfrm>
+            <a:off x="11026082" y="5694344"/>
+            <a:ext cx="886056" cy="1101986"/>
+          </a:xfrm>
+          <a:prstGeom prst="rect">
+            <a:avLst/>
+          </a:prstGeom>
+        </p:spPr>
+      </p:pic>
     </p:spTree>
     <p:extLst>
       <p:ext uri="{BB962C8B-B14F-4D97-AF65-F5344CB8AC3E}">
@@ -6455,6 +6534,43 @@
           </a:p>
         </p:txBody>
       </p:sp>
+      <p:pic>
+        <p:nvPicPr>
+          <p:cNvPr id="4" name="Рисунок 3"/>
+          <p:cNvPicPr>
+            <a:picLocks noChangeAspect="1"/>
+          </p:cNvPicPr>
+          <p:nvPr/>
+        </p:nvPicPr>
+        <p:blipFill>
+          <a:blip r:embed="rId2">
+            <a:duotone>
+              <a:prstClr val="black"/>
+              <a:srgbClr val="FF0000">
+                <a:tint val="45000"/>
+                <a:satMod val="400000"/>
+              </a:srgbClr>
+            </a:duotone>
+            <a:extLst>
+              <a:ext uri="{28A0092B-C50C-407E-A947-70E740481C1C}">
+                <a14:useLocalDpi xmlns:a14="http://schemas.microsoft.com/office/drawing/2010/main" val="0"/>
+              </a:ext>
+            </a:extLst>
+          </a:blip>
+          <a:stretch>
+            <a:fillRect/>
+          </a:stretch>
+        </p:blipFill>
+        <p:spPr>
+          <a:xfrm>
+            <a:off x="11026082" y="5694344"/>
+            <a:ext cx="886056" cy="1101986"/>
+          </a:xfrm>
+          <a:prstGeom prst="rect">
+            <a:avLst/>
+          </a:prstGeom>
+        </p:spPr>
+      </p:pic>
     </p:spTree>
     <p:extLst>
       <p:ext uri="{BB962C8B-B14F-4D97-AF65-F5344CB8AC3E}">
@@ -6867,6 +6983,43 @@
           </a:p>
         </p:txBody>
       </p:sp>
+      <p:pic>
+        <p:nvPicPr>
+          <p:cNvPr id="5" name="Рисунок 4"/>
+          <p:cNvPicPr>
+            <a:picLocks noChangeAspect="1"/>
+          </p:cNvPicPr>
+          <p:nvPr/>
+        </p:nvPicPr>
+        <p:blipFill>
+          <a:blip r:embed="rId2">
+            <a:duotone>
+              <a:prstClr val="black"/>
+              <a:srgbClr val="FF0000">
+                <a:tint val="45000"/>
+                <a:satMod val="400000"/>
+              </a:srgbClr>
+            </a:duotone>
+            <a:extLst>
+              <a:ext uri="{28A0092B-C50C-407E-A947-70E740481C1C}">
+                <a14:useLocalDpi xmlns:a14="http://schemas.microsoft.com/office/drawing/2010/main" val="0"/>
+              </a:ext>
+            </a:extLst>
+          </a:blip>
+          <a:stretch>
+            <a:fillRect/>
+          </a:stretch>
+        </p:blipFill>
+        <p:spPr>
+          <a:xfrm>
+            <a:off x="11026082" y="5694344"/>
+            <a:ext cx="886056" cy="1101986"/>
+          </a:xfrm>
+          <a:prstGeom prst="rect">
+            <a:avLst/>
+          </a:prstGeom>
+        </p:spPr>
+      </p:pic>
     </p:spTree>
     <p:extLst>
       <p:ext uri="{BB962C8B-B14F-4D97-AF65-F5344CB8AC3E}">
@@ -7163,6 +7316,43 @@
           </a:p>
         </p:txBody>
       </p:sp>
+      <p:pic>
+        <p:nvPicPr>
+          <p:cNvPr id="7" name="Рисунок 6"/>
+          <p:cNvPicPr>
+            <a:picLocks noChangeAspect="1"/>
+          </p:cNvPicPr>
+          <p:nvPr/>
+        </p:nvPicPr>
+        <p:blipFill>
+          <a:blip r:embed="rId2">
+            <a:duotone>
+              <a:prstClr val="black"/>
+              <a:srgbClr val="FF0000">
+                <a:tint val="45000"/>
+                <a:satMod val="400000"/>
+              </a:srgbClr>
+            </a:duotone>
+            <a:extLst>
+              <a:ext uri="{28A0092B-C50C-407E-A947-70E740481C1C}">
+                <a14:useLocalDpi xmlns:a14="http://schemas.microsoft.com/office/drawing/2010/main" val="0"/>
+              </a:ext>
+            </a:extLst>
+          </a:blip>
+          <a:stretch>
+            <a:fillRect/>
+          </a:stretch>
+        </p:blipFill>
+        <p:spPr>
+          <a:xfrm>
+            <a:off x="11026082" y="5694344"/>
+            <a:ext cx="886056" cy="1101986"/>
+          </a:xfrm>
+          <a:prstGeom prst="rect">
+            <a:avLst/>
+          </a:prstGeom>
+        </p:spPr>
+      </p:pic>
     </p:spTree>
     <p:extLst>
       <p:ext uri="{BB962C8B-B14F-4D97-AF65-F5344CB8AC3E}">
@@ -7554,6 +7744,43 @@
           </a:p>
         </p:txBody>
       </p:sp>
+      <p:pic>
+        <p:nvPicPr>
+          <p:cNvPr id="6" name="Рисунок 5"/>
+          <p:cNvPicPr>
+            <a:picLocks noChangeAspect="1"/>
+          </p:cNvPicPr>
+          <p:nvPr/>
+        </p:nvPicPr>
+        <p:blipFill>
+          <a:blip r:embed="rId2">
+            <a:duotone>
+              <a:prstClr val="black"/>
+              <a:srgbClr val="FF0000">
+                <a:tint val="45000"/>
+                <a:satMod val="400000"/>
+              </a:srgbClr>
+            </a:duotone>
+            <a:extLst>
+              <a:ext uri="{28A0092B-C50C-407E-A947-70E740481C1C}">
+                <a14:useLocalDpi xmlns:a14="http://schemas.microsoft.com/office/drawing/2010/main" val="0"/>
+              </a:ext>
+            </a:extLst>
+          </a:blip>
+          <a:stretch>
+            <a:fillRect/>
+          </a:stretch>
+        </p:blipFill>
+        <p:spPr>
+          <a:xfrm>
+            <a:off x="11026082" y="5694344"/>
+            <a:ext cx="886056" cy="1101986"/>
+          </a:xfrm>
+          <a:prstGeom prst="rect">
+            <a:avLst/>
+          </a:prstGeom>
+        </p:spPr>
+      </p:pic>
     </p:spTree>
     <p:extLst>
       <p:ext uri="{BB962C8B-B14F-4D97-AF65-F5344CB8AC3E}">
@@ -7683,6 +7910,43 @@
           </a:p>
         </p:txBody>
       </p:sp>
+      <p:pic>
+        <p:nvPicPr>
+          <p:cNvPr id="4" name="Рисунок 3"/>
+          <p:cNvPicPr>
+            <a:picLocks noChangeAspect="1"/>
+          </p:cNvPicPr>
+          <p:nvPr/>
+        </p:nvPicPr>
+        <p:blipFill>
+          <a:blip r:embed="rId2">
+            <a:duotone>
+              <a:prstClr val="black"/>
+              <a:srgbClr val="FF0000">
+                <a:tint val="45000"/>
+                <a:satMod val="400000"/>
+              </a:srgbClr>
+            </a:duotone>
+            <a:extLst>
+              <a:ext uri="{28A0092B-C50C-407E-A947-70E740481C1C}">
+                <a14:useLocalDpi xmlns:a14="http://schemas.microsoft.com/office/drawing/2010/main" val="0"/>
+              </a:ext>
+            </a:extLst>
+          </a:blip>
+          <a:stretch>
+            <a:fillRect/>
+          </a:stretch>
+        </p:blipFill>
+        <p:spPr>
+          <a:xfrm>
+            <a:off x="11026082" y="5694344"/>
+            <a:ext cx="886056" cy="1101986"/>
+          </a:xfrm>
+          <a:prstGeom prst="rect">
+            <a:avLst/>
+          </a:prstGeom>
+        </p:spPr>
+      </p:pic>
     </p:spTree>
     <p:extLst>
       <p:ext uri="{BB962C8B-B14F-4D97-AF65-F5344CB8AC3E}">
@@ -7860,6 +8124,43 @@
           </a:p>
         </p:txBody>
       </p:sp>
+      <p:pic>
+        <p:nvPicPr>
+          <p:cNvPr id="7" name="Рисунок 6"/>
+          <p:cNvPicPr>
+            <a:picLocks noChangeAspect="1"/>
+          </p:cNvPicPr>
+          <p:nvPr/>
+        </p:nvPicPr>
+        <p:blipFill>
+          <a:blip r:embed="rId3">
+            <a:duotone>
+              <a:prstClr val="black"/>
+              <a:srgbClr val="FF0000">
+                <a:tint val="45000"/>
+                <a:satMod val="400000"/>
+              </a:srgbClr>
+            </a:duotone>
+            <a:extLst>
+              <a:ext uri="{28A0092B-C50C-407E-A947-70E740481C1C}">
+                <a14:useLocalDpi xmlns:a14="http://schemas.microsoft.com/office/drawing/2010/main" val="0"/>
+              </a:ext>
+            </a:extLst>
+          </a:blip>
+          <a:stretch>
+            <a:fillRect/>
+          </a:stretch>
+        </p:blipFill>
+        <p:spPr>
+          <a:xfrm>
+            <a:off x="11026082" y="5694344"/>
+            <a:ext cx="886056" cy="1101986"/>
+          </a:xfrm>
+          <a:prstGeom prst="rect">
+            <a:avLst/>
+          </a:prstGeom>
+        </p:spPr>
+      </p:pic>
     </p:spTree>
     <p:extLst>
       <p:ext uri="{BB962C8B-B14F-4D97-AF65-F5344CB8AC3E}">
@@ -8232,6 +8533,43 @@
           </a:p>
         </p:txBody>
       </p:sp>
+      <p:pic>
+        <p:nvPicPr>
+          <p:cNvPr id="6" name="Рисунок 5"/>
+          <p:cNvPicPr>
+            <a:picLocks noChangeAspect="1"/>
+          </p:cNvPicPr>
+          <p:nvPr/>
+        </p:nvPicPr>
+        <p:blipFill>
+          <a:blip r:embed="rId2">
+            <a:duotone>
+              <a:prstClr val="black"/>
+              <a:srgbClr val="FF0000">
+                <a:tint val="45000"/>
+                <a:satMod val="400000"/>
+              </a:srgbClr>
+            </a:duotone>
+            <a:extLst>
+              <a:ext uri="{28A0092B-C50C-407E-A947-70E740481C1C}">
+                <a14:useLocalDpi xmlns:a14="http://schemas.microsoft.com/office/drawing/2010/main" val="0"/>
+              </a:ext>
+            </a:extLst>
+          </a:blip>
+          <a:stretch>
+            <a:fillRect/>
+          </a:stretch>
+        </p:blipFill>
+        <p:spPr>
+          <a:xfrm>
+            <a:off x="11026082" y="5694344"/>
+            <a:ext cx="886056" cy="1101986"/>
+          </a:xfrm>
+          <a:prstGeom prst="rect">
+            <a:avLst/>
+          </a:prstGeom>
+        </p:spPr>
+      </p:pic>
     </p:spTree>
     <p:extLst>
       <p:ext uri="{BB962C8B-B14F-4D97-AF65-F5344CB8AC3E}">
@@ -8507,6 +8845,43 @@
           </a:p>
         </p:txBody>
       </p:sp>
+      <p:pic>
+        <p:nvPicPr>
+          <p:cNvPr id="6" name="Рисунок 5"/>
+          <p:cNvPicPr>
+            <a:picLocks noChangeAspect="1"/>
+          </p:cNvPicPr>
+          <p:nvPr/>
+        </p:nvPicPr>
+        <p:blipFill>
+          <a:blip r:embed="rId3">
+            <a:duotone>
+              <a:prstClr val="black"/>
+              <a:srgbClr val="FF0000">
+                <a:tint val="45000"/>
+                <a:satMod val="400000"/>
+              </a:srgbClr>
+            </a:duotone>
+            <a:extLst>
+              <a:ext uri="{28A0092B-C50C-407E-A947-70E740481C1C}">
+                <a14:useLocalDpi xmlns:a14="http://schemas.microsoft.com/office/drawing/2010/main" val="0"/>
+              </a:ext>
+            </a:extLst>
+          </a:blip>
+          <a:stretch>
+            <a:fillRect/>
+          </a:stretch>
+        </p:blipFill>
+        <p:spPr>
+          <a:xfrm>
+            <a:off x="11026082" y="5694344"/>
+            <a:ext cx="886056" cy="1101986"/>
+          </a:xfrm>
+          <a:prstGeom prst="rect">
+            <a:avLst/>
+          </a:prstGeom>
+        </p:spPr>
+      </p:pic>
     </p:spTree>
     <p:extLst>
       <p:ext uri="{BB962C8B-B14F-4D97-AF65-F5344CB8AC3E}">

</xml_diff>